<commit_message>
Second part of attention blog
</commit_message>
<xml_diff>
--- a/assets/images/attention-single-hop.pptx
+++ b/assets/images/attention-single-hop.pptx
@@ -104,6 +104,11 @@
       </a:defRPr>
     </a:lvl9pPr>
   </p:defaultTextStyle>
+  <p:extLst>
+    <p:ext uri="{EFAFB233-063F-42B5-8137-9DF3F51BA10A}">
+      <p15:sldGuideLst xmlns:p15="http://schemas.microsoft.com/office/powerpoint/2012/main"/>
+    </p:ext>
+  </p:extLst>
 </p:presentation>
 </file>
 
@@ -238,7 +243,7 @@
           <a:p>
             <a:fld id="{C95A0C02-1135-0246-ACCB-CD620E5C8101}" type="datetimeFigureOut">
               <a:rPr lang="en-US" smtClean="0"/>
-              <a:t>6/6/19</a:t>
+              <a:t>6/7/19</a:t>
             </a:fld>
             <a:endParaRPr lang="en-US"/>
           </a:p>
@@ -408,7 +413,7 @@
           <a:p>
             <a:fld id="{C95A0C02-1135-0246-ACCB-CD620E5C8101}" type="datetimeFigureOut">
               <a:rPr lang="en-US" smtClean="0"/>
-              <a:t>6/6/19</a:t>
+              <a:t>6/7/19</a:t>
             </a:fld>
             <a:endParaRPr lang="en-US"/>
           </a:p>
@@ -588,7 +593,7 @@
           <a:p>
             <a:fld id="{C95A0C02-1135-0246-ACCB-CD620E5C8101}" type="datetimeFigureOut">
               <a:rPr lang="en-US" smtClean="0"/>
-              <a:t>6/6/19</a:t>
+              <a:t>6/7/19</a:t>
             </a:fld>
             <a:endParaRPr lang="en-US"/>
           </a:p>
@@ -758,7 +763,7 @@
           <a:p>
             <a:fld id="{C95A0C02-1135-0246-ACCB-CD620E5C8101}" type="datetimeFigureOut">
               <a:rPr lang="en-US" smtClean="0"/>
-              <a:t>6/6/19</a:t>
+              <a:t>6/7/19</a:t>
             </a:fld>
             <a:endParaRPr lang="en-US"/>
           </a:p>
@@ -1004,7 +1009,7 @@
           <a:p>
             <a:fld id="{C95A0C02-1135-0246-ACCB-CD620E5C8101}" type="datetimeFigureOut">
               <a:rPr lang="en-US" smtClean="0"/>
-              <a:t>6/6/19</a:t>
+              <a:t>6/7/19</a:t>
             </a:fld>
             <a:endParaRPr lang="en-US"/>
           </a:p>
@@ -1236,7 +1241,7 @@
           <a:p>
             <a:fld id="{C95A0C02-1135-0246-ACCB-CD620E5C8101}" type="datetimeFigureOut">
               <a:rPr lang="en-US" smtClean="0"/>
-              <a:t>6/6/19</a:t>
+              <a:t>6/7/19</a:t>
             </a:fld>
             <a:endParaRPr lang="en-US"/>
           </a:p>
@@ -1603,7 +1608,7 @@
           <a:p>
             <a:fld id="{C95A0C02-1135-0246-ACCB-CD620E5C8101}" type="datetimeFigureOut">
               <a:rPr lang="en-US" smtClean="0"/>
-              <a:t>6/6/19</a:t>
+              <a:t>6/7/19</a:t>
             </a:fld>
             <a:endParaRPr lang="en-US"/>
           </a:p>
@@ -1721,7 +1726,7 @@
           <a:p>
             <a:fld id="{C95A0C02-1135-0246-ACCB-CD620E5C8101}" type="datetimeFigureOut">
               <a:rPr lang="en-US" smtClean="0"/>
-              <a:t>6/6/19</a:t>
+              <a:t>6/7/19</a:t>
             </a:fld>
             <a:endParaRPr lang="en-US"/>
           </a:p>
@@ -1816,7 +1821,7 @@
           <a:p>
             <a:fld id="{C95A0C02-1135-0246-ACCB-CD620E5C8101}" type="datetimeFigureOut">
               <a:rPr lang="en-US" smtClean="0"/>
-              <a:t>6/6/19</a:t>
+              <a:t>6/7/19</a:t>
             </a:fld>
             <a:endParaRPr lang="en-US"/>
           </a:p>
@@ -2093,7 +2098,7 @@
           <a:p>
             <a:fld id="{C95A0C02-1135-0246-ACCB-CD620E5C8101}" type="datetimeFigureOut">
               <a:rPr lang="en-US" smtClean="0"/>
-              <a:t>6/6/19</a:t>
+              <a:t>6/7/19</a:t>
             </a:fld>
             <a:endParaRPr lang="en-US"/>
           </a:p>
@@ -2350,7 +2355,7 @@
           <a:p>
             <a:fld id="{C95A0C02-1135-0246-ACCB-CD620E5C8101}" type="datetimeFigureOut">
               <a:rPr lang="en-US" smtClean="0"/>
-              <a:t>6/6/19</a:t>
+              <a:t>6/7/19</a:t>
             </a:fld>
             <a:endParaRPr lang="en-US"/>
           </a:p>
@@ -2563,7 +2568,7 @@
           <a:p>
             <a:fld id="{C95A0C02-1135-0246-ACCB-CD620E5C8101}" type="datetimeFigureOut">
               <a:rPr lang="en-US" smtClean="0"/>
-              <a:t>6/6/19</a:t>
+              <a:t>6/7/19</a:t>
             </a:fld>
             <a:endParaRPr lang="en-US"/>
           </a:p>

</xml_diff>

<commit_message>
Small modifications to the attention blog post
</commit_message>
<xml_diff>
--- a/assets/images/attention-single-hop.pptx
+++ b/assets/images/attention-single-hop.pptx
@@ -243,7 +243,7 @@
           <a:p>
             <a:fld id="{C95A0C02-1135-0246-ACCB-CD620E5C8101}" type="datetimeFigureOut">
               <a:rPr lang="en-US" smtClean="0"/>
-              <a:t>6/7/19</a:t>
+              <a:t>6/9/19</a:t>
             </a:fld>
             <a:endParaRPr lang="en-US"/>
           </a:p>
@@ -413,7 +413,7 @@
           <a:p>
             <a:fld id="{C95A0C02-1135-0246-ACCB-CD620E5C8101}" type="datetimeFigureOut">
               <a:rPr lang="en-US" smtClean="0"/>
-              <a:t>6/7/19</a:t>
+              <a:t>6/9/19</a:t>
             </a:fld>
             <a:endParaRPr lang="en-US"/>
           </a:p>
@@ -593,7 +593,7 @@
           <a:p>
             <a:fld id="{C95A0C02-1135-0246-ACCB-CD620E5C8101}" type="datetimeFigureOut">
               <a:rPr lang="en-US" smtClean="0"/>
-              <a:t>6/7/19</a:t>
+              <a:t>6/9/19</a:t>
             </a:fld>
             <a:endParaRPr lang="en-US"/>
           </a:p>
@@ -763,7 +763,7 @@
           <a:p>
             <a:fld id="{C95A0C02-1135-0246-ACCB-CD620E5C8101}" type="datetimeFigureOut">
               <a:rPr lang="en-US" smtClean="0"/>
-              <a:t>6/7/19</a:t>
+              <a:t>6/9/19</a:t>
             </a:fld>
             <a:endParaRPr lang="en-US"/>
           </a:p>
@@ -1009,7 +1009,7 @@
           <a:p>
             <a:fld id="{C95A0C02-1135-0246-ACCB-CD620E5C8101}" type="datetimeFigureOut">
               <a:rPr lang="en-US" smtClean="0"/>
-              <a:t>6/7/19</a:t>
+              <a:t>6/9/19</a:t>
             </a:fld>
             <a:endParaRPr lang="en-US"/>
           </a:p>
@@ -1241,7 +1241,7 @@
           <a:p>
             <a:fld id="{C95A0C02-1135-0246-ACCB-CD620E5C8101}" type="datetimeFigureOut">
               <a:rPr lang="en-US" smtClean="0"/>
-              <a:t>6/7/19</a:t>
+              <a:t>6/9/19</a:t>
             </a:fld>
             <a:endParaRPr lang="en-US"/>
           </a:p>
@@ -1608,7 +1608,7 @@
           <a:p>
             <a:fld id="{C95A0C02-1135-0246-ACCB-CD620E5C8101}" type="datetimeFigureOut">
               <a:rPr lang="en-US" smtClean="0"/>
-              <a:t>6/7/19</a:t>
+              <a:t>6/9/19</a:t>
             </a:fld>
             <a:endParaRPr lang="en-US"/>
           </a:p>
@@ -1726,7 +1726,7 @@
           <a:p>
             <a:fld id="{C95A0C02-1135-0246-ACCB-CD620E5C8101}" type="datetimeFigureOut">
               <a:rPr lang="en-US" smtClean="0"/>
-              <a:t>6/7/19</a:t>
+              <a:t>6/9/19</a:t>
             </a:fld>
             <a:endParaRPr lang="en-US"/>
           </a:p>
@@ -1821,7 +1821,7 @@
           <a:p>
             <a:fld id="{C95A0C02-1135-0246-ACCB-CD620E5C8101}" type="datetimeFigureOut">
               <a:rPr lang="en-US" smtClean="0"/>
-              <a:t>6/7/19</a:t>
+              <a:t>6/9/19</a:t>
             </a:fld>
             <a:endParaRPr lang="en-US"/>
           </a:p>
@@ -2098,7 +2098,7 @@
           <a:p>
             <a:fld id="{C95A0C02-1135-0246-ACCB-CD620E5C8101}" type="datetimeFigureOut">
               <a:rPr lang="en-US" smtClean="0"/>
-              <a:t>6/7/19</a:t>
+              <a:t>6/9/19</a:t>
             </a:fld>
             <a:endParaRPr lang="en-US"/>
           </a:p>
@@ -2355,7 +2355,7 @@
           <a:p>
             <a:fld id="{C95A0C02-1135-0246-ACCB-CD620E5C8101}" type="datetimeFigureOut">
               <a:rPr lang="en-US" smtClean="0"/>
-              <a:t>6/7/19</a:t>
+              <a:t>6/9/19</a:t>
             </a:fld>
             <a:endParaRPr lang="en-US"/>
           </a:p>
@@ -2568,7 +2568,7 @@
           <a:p>
             <a:fld id="{C95A0C02-1135-0246-ACCB-CD620E5C8101}" type="datetimeFigureOut">
               <a:rPr lang="en-US" smtClean="0"/>
-              <a:t>6/7/19</a:t>
+              <a:t>6/9/19</a:t>
             </a:fld>
             <a:endParaRPr lang="en-US"/>
           </a:p>
@@ -6663,8 +6663,8 @@
         </p:nvSpPr>
         <p:spPr>
           <a:xfrm>
-            <a:off x="2579027" y="734521"/>
-            <a:ext cx="873701" cy="461665"/>
+            <a:off x="2579027" y="598869"/>
+            <a:ext cx="873701" cy="646331"/>
           </a:xfrm>
           <a:prstGeom prst="rect">
             <a:avLst/>
@@ -6699,6 +6699,33 @@
               </a:rPr>
               <a:t>weights</a:t>
             </a:r>
+          </a:p>
+          <a:p>
+            <a:pPr algn="ctr"/>
+            <a:r>
+              <a:rPr lang="en-US" sz="1200" dirty="0" err="1">
+                <a:solidFill>
+                  <a:schemeClr val="bg1"/>
+                </a:solidFill>
+                <a:latin typeface="Avenir Next" panose="020B0503020202020204" pitchFamily="34" charset="0"/>
+              </a:rPr>
+              <a:t>p</a:t>
+            </a:r>
+            <a:r>
+              <a:rPr lang="en-US" sz="1200" baseline="-25000" dirty="0" err="1">
+                <a:solidFill>
+                  <a:schemeClr val="bg1"/>
+                </a:solidFill>
+                <a:latin typeface="Avenir Next" panose="020B0503020202020204" pitchFamily="34" charset="0"/>
+              </a:rPr>
+              <a:t>att</a:t>
+            </a:r>
+            <a:endParaRPr lang="en-US" sz="1200" baseline="-25000" dirty="0">
+              <a:solidFill>
+                <a:schemeClr val="bg1"/>
+              </a:solidFill>
+              <a:latin typeface="Avenir Next" panose="020B0503020202020204" pitchFamily="34" charset="0"/>
+            </a:endParaRPr>
           </a:p>
         </p:txBody>
       </p:sp>
@@ -7798,6 +7825,110 @@
           </a:p>
         </p:txBody>
       </p:sp>
+      <p:sp>
+        <p:nvSpPr>
+          <p:cNvPr id="99" name="TextBox 98">
+            <a:extLst>
+              <a:ext uri="{FF2B5EF4-FFF2-40B4-BE49-F238E27FC236}">
+                <a16:creationId xmlns:a16="http://schemas.microsoft.com/office/drawing/2014/main" id="{8D4B812D-3DC0-694A-8B15-378C5DE8FC92}"/>
+              </a:ext>
+            </a:extLst>
+          </p:cNvPr>
+          <p:cNvSpPr txBox="1"/>
+          <p:nvPr/>
+        </p:nvSpPr>
+        <p:spPr>
+          <a:xfrm>
+            <a:off x="364622" y="1919989"/>
+            <a:ext cx="364202" cy="307777"/>
+          </a:xfrm>
+          <a:prstGeom prst="rect">
+            <a:avLst/>
+          </a:prstGeom>
+          <a:noFill/>
+        </p:spPr>
+        <p:txBody>
+          <a:bodyPr wrap="none" rtlCol="0">
+            <a:spAutoFit/>
+          </a:bodyPr>
+          <a:lstStyle/>
+          <a:p>
+            <a:r>
+              <a:rPr lang="en-US" sz="1400" dirty="0" err="1">
+                <a:latin typeface="Monaco" pitchFamily="2" charset="77"/>
+                <a:ea typeface="Helvetica Neue" panose="02000503000000020004" pitchFamily="2" charset="0"/>
+                <a:cs typeface="Helvetica Neue" panose="02000503000000020004" pitchFamily="2" charset="0"/>
+              </a:rPr>
+              <a:t>v</a:t>
+            </a:r>
+            <a:r>
+              <a:rPr lang="en-US" sz="1400" baseline="-25000" dirty="0" err="1">
+                <a:latin typeface="Monaco" pitchFamily="2" charset="77"/>
+                <a:ea typeface="Helvetica Neue" panose="02000503000000020004" pitchFamily="2" charset="0"/>
+                <a:cs typeface="Helvetica Neue" panose="02000503000000020004" pitchFamily="2" charset="0"/>
+              </a:rPr>
+              <a:t>Q</a:t>
+            </a:r>
+            <a:endParaRPr lang="en-US" sz="1200" baseline="-25000" dirty="0">
+              <a:latin typeface="Monaco" pitchFamily="2" charset="77"/>
+              <a:ea typeface="Helvetica Neue" panose="02000503000000020004" pitchFamily="2" charset="0"/>
+              <a:cs typeface="Helvetica Neue" panose="02000503000000020004" pitchFamily="2" charset="0"/>
+            </a:endParaRPr>
+          </a:p>
+        </p:txBody>
+      </p:sp>
+      <p:sp>
+        <p:nvSpPr>
+          <p:cNvPr id="100" name="TextBox 99">
+            <a:extLst>
+              <a:ext uri="{FF2B5EF4-FFF2-40B4-BE49-F238E27FC236}">
+                <a16:creationId xmlns:a16="http://schemas.microsoft.com/office/drawing/2014/main" id="{52CD9250-273C-F749-90F3-23E5F32EA184}"/>
+              </a:ext>
+            </a:extLst>
+          </p:cNvPr>
+          <p:cNvSpPr txBox="1"/>
+          <p:nvPr/>
+        </p:nvSpPr>
+        <p:spPr>
+          <a:xfrm>
+            <a:off x="452685" y="696084"/>
+            <a:ext cx="364202" cy="307777"/>
+          </a:xfrm>
+          <a:prstGeom prst="rect">
+            <a:avLst/>
+          </a:prstGeom>
+          <a:noFill/>
+        </p:spPr>
+        <p:txBody>
+          <a:bodyPr wrap="none" rtlCol="0">
+            <a:spAutoFit/>
+          </a:bodyPr>
+          <a:lstStyle/>
+          <a:p>
+            <a:r>
+              <a:rPr lang="en-US" sz="1400" dirty="0">
+                <a:latin typeface="Monaco" pitchFamily="2" charset="77"/>
+                <a:ea typeface="Helvetica Neue" panose="02000503000000020004" pitchFamily="2" charset="0"/>
+                <a:cs typeface="Helvetica Neue" panose="02000503000000020004" pitchFamily="2" charset="0"/>
+              </a:rPr>
+              <a:t>v</a:t>
+            </a:r>
+            <a:r>
+              <a:rPr lang="en-US" sz="1400" baseline="-25000" dirty="0">
+                <a:latin typeface="Monaco" pitchFamily="2" charset="77"/>
+                <a:ea typeface="Helvetica Neue" panose="02000503000000020004" pitchFamily="2" charset="0"/>
+                <a:cs typeface="Helvetica Neue" panose="02000503000000020004" pitchFamily="2" charset="0"/>
+              </a:rPr>
+              <a:t>I</a:t>
+            </a:r>
+            <a:endParaRPr lang="en-US" sz="1200" baseline="-25000" dirty="0">
+              <a:latin typeface="Monaco" pitchFamily="2" charset="77"/>
+              <a:ea typeface="Helvetica Neue" panose="02000503000000020004" pitchFamily="2" charset="0"/>
+              <a:cs typeface="Helvetica Neue" panose="02000503000000020004" pitchFamily="2" charset="0"/>
+            </a:endParaRPr>
+          </a:p>
+        </p:txBody>
+      </p:sp>
     </p:spTree>
     <p:extLst>
       <p:ext uri="{BB962C8B-B14F-4D97-AF65-F5344CB8AC3E}">

</xml_diff>